<commit_message>
added puppy growth data
</commit_message>
<xml_diff>
--- a/womenwaterwork/data_data_everywhere.pptx
+++ b/womenwaterwork/data_data_everywhere.pptx
@@ -13,15 +13,17 @@
     <p:sldId id="265" r:id="rId7"/>
     <p:sldId id="266" r:id="rId8"/>
     <p:sldId id="267" r:id="rId9"/>
-    <p:sldId id="258" r:id="rId10"/>
-    <p:sldId id="272" r:id="rId11"/>
-    <p:sldId id="259" r:id="rId12"/>
-    <p:sldId id="260" r:id="rId13"/>
-    <p:sldId id="261" r:id="rId14"/>
-    <p:sldId id="271" r:id="rId15"/>
-    <p:sldId id="263" r:id="rId16"/>
-    <p:sldId id="262" r:id="rId17"/>
-    <p:sldId id="269" r:id="rId18"/>
+    <p:sldId id="273" r:id="rId10"/>
+    <p:sldId id="258" r:id="rId11"/>
+    <p:sldId id="272" r:id="rId12"/>
+    <p:sldId id="259" r:id="rId13"/>
+    <p:sldId id="260" r:id="rId14"/>
+    <p:sldId id="261" r:id="rId15"/>
+    <p:sldId id="271" r:id="rId16"/>
+    <p:sldId id="263" r:id="rId17"/>
+    <p:sldId id="262" r:id="rId18"/>
+    <p:sldId id="269" r:id="rId19"/>
+    <p:sldId id="274" r:id="rId20"/>
   </p:sldIdLst>
   <p:sldSz cx="9144000" cy="6858000" type="screen4x3"/>
   <p:notesSz cx="6858000" cy="9144000"/>
@@ -357,7 +359,7 @@
     </p:spTree>
     <p:extLst>
       <p:ext uri="{BB962C8B-B14F-4D97-AF65-F5344CB8AC3E}">
-        <p14:creationId xmlns="" xmlns:p14="http://schemas.microsoft.com/office/powerpoint/2010/main" val="2032476918"/>
+        <p14:creationId xmlns:p14="http://schemas.microsoft.com/office/powerpoint/2010/main" val="2032476918"/>
       </p:ext>
     </p:extLst>
   </p:cSld>
@@ -529,7 +531,7 @@
     </p:spTree>
     <p:extLst>
       <p:ext uri="{BB962C8B-B14F-4D97-AF65-F5344CB8AC3E}">
-        <p14:creationId xmlns="" xmlns:p14="http://schemas.microsoft.com/office/powerpoint/2010/main" val="2157857672"/>
+        <p14:creationId xmlns:p14="http://schemas.microsoft.com/office/powerpoint/2010/main" val="2157857672"/>
       </p:ext>
     </p:extLst>
   </p:cSld>
@@ -711,7 +713,7 @@
     </p:spTree>
     <p:extLst>
       <p:ext uri="{BB962C8B-B14F-4D97-AF65-F5344CB8AC3E}">
-        <p14:creationId xmlns="" xmlns:p14="http://schemas.microsoft.com/office/powerpoint/2010/main" val="1145485796"/>
+        <p14:creationId xmlns:p14="http://schemas.microsoft.com/office/powerpoint/2010/main" val="1145485796"/>
       </p:ext>
     </p:extLst>
   </p:cSld>
@@ -883,7 +885,7 @@
     </p:spTree>
     <p:extLst>
       <p:ext uri="{BB962C8B-B14F-4D97-AF65-F5344CB8AC3E}">
-        <p14:creationId xmlns="" xmlns:p14="http://schemas.microsoft.com/office/powerpoint/2010/main" val="1644102879"/>
+        <p14:creationId xmlns:p14="http://schemas.microsoft.com/office/powerpoint/2010/main" val="1644102879"/>
       </p:ext>
     </p:extLst>
   </p:cSld>
@@ -1131,7 +1133,7 @@
     </p:spTree>
     <p:extLst>
       <p:ext uri="{BB962C8B-B14F-4D97-AF65-F5344CB8AC3E}">
-        <p14:creationId xmlns="" xmlns:p14="http://schemas.microsoft.com/office/powerpoint/2010/main" val="2210312031"/>
+        <p14:creationId xmlns:p14="http://schemas.microsoft.com/office/powerpoint/2010/main" val="2210312031"/>
       </p:ext>
     </p:extLst>
   </p:cSld>
@@ -1421,7 +1423,7 @@
     </p:spTree>
     <p:extLst>
       <p:ext uri="{BB962C8B-B14F-4D97-AF65-F5344CB8AC3E}">
-        <p14:creationId xmlns="" xmlns:p14="http://schemas.microsoft.com/office/powerpoint/2010/main" val="1720648197"/>
+        <p14:creationId xmlns:p14="http://schemas.microsoft.com/office/powerpoint/2010/main" val="1720648197"/>
       </p:ext>
     </p:extLst>
   </p:cSld>
@@ -1845,7 +1847,7 @@
     </p:spTree>
     <p:extLst>
       <p:ext uri="{BB962C8B-B14F-4D97-AF65-F5344CB8AC3E}">
-        <p14:creationId xmlns="" xmlns:p14="http://schemas.microsoft.com/office/powerpoint/2010/main" val="3338183190"/>
+        <p14:creationId xmlns:p14="http://schemas.microsoft.com/office/powerpoint/2010/main" val="3338183190"/>
       </p:ext>
     </p:extLst>
   </p:cSld>
@@ -1965,7 +1967,7 @@
     </p:spTree>
     <p:extLst>
       <p:ext uri="{BB962C8B-B14F-4D97-AF65-F5344CB8AC3E}">
-        <p14:creationId xmlns="" xmlns:p14="http://schemas.microsoft.com/office/powerpoint/2010/main" val="35055163"/>
+        <p14:creationId xmlns:p14="http://schemas.microsoft.com/office/powerpoint/2010/main" val="35055163"/>
       </p:ext>
     </p:extLst>
   </p:cSld>
@@ -2062,7 +2064,7 @@
     </p:spTree>
     <p:extLst>
       <p:ext uri="{BB962C8B-B14F-4D97-AF65-F5344CB8AC3E}">
-        <p14:creationId xmlns="" xmlns:p14="http://schemas.microsoft.com/office/powerpoint/2010/main" val="485059008"/>
+        <p14:creationId xmlns:p14="http://schemas.microsoft.com/office/powerpoint/2010/main" val="485059008"/>
       </p:ext>
     </p:extLst>
   </p:cSld>
@@ -2341,7 +2343,7 @@
     </p:spTree>
     <p:extLst>
       <p:ext uri="{BB962C8B-B14F-4D97-AF65-F5344CB8AC3E}">
-        <p14:creationId xmlns="" xmlns:p14="http://schemas.microsoft.com/office/powerpoint/2010/main" val="3767217831"/>
+        <p14:creationId xmlns:p14="http://schemas.microsoft.com/office/powerpoint/2010/main" val="3767217831"/>
       </p:ext>
     </p:extLst>
   </p:cSld>
@@ -2596,7 +2598,7 @@
     </p:spTree>
     <p:extLst>
       <p:ext uri="{BB962C8B-B14F-4D97-AF65-F5344CB8AC3E}">
-        <p14:creationId xmlns="" xmlns:p14="http://schemas.microsoft.com/office/powerpoint/2010/main" val="2440786531"/>
+        <p14:creationId xmlns:p14="http://schemas.microsoft.com/office/powerpoint/2010/main" val="2440786531"/>
       </p:ext>
     </p:extLst>
   </p:cSld>
@@ -2847,7 +2849,7 @@
     </p:spTree>
     <p:extLst>
       <p:ext uri="{BB962C8B-B14F-4D97-AF65-F5344CB8AC3E}">
-        <p14:creationId xmlns="" xmlns:p14="http://schemas.microsoft.com/office/powerpoint/2010/main" val="1147560372"/>
+        <p14:creationId xmlns:p14="http://schemas.microsoft.com/office/powerpoint/2010/main" val="1147560372"/>
       </p:ext>
     </p:extLst>
   </p:cSld>
@@ -3222,7 +3224,7 @@
       </p:grpSpPr>
       <p:sp>
         <p:nvSpPr>
-          <p:cNvPr id="2" name="Title 1"/>
+          <p:cNvPr id="4" name="Title 3"/>
           <p:cNvSpPr>
             <a:spLocks noGrp="1"/>
           </p:cNvSpPr>
@@ -3232,41 +3234,190 @@
         </p:nvSpPr>
         <p:spPr/>
         <p:txBody>
+          <a:bodyPr>
+            <a:normAutofit fontScale="90000"/>
+          </a:bodyPr>
+          <a:lstStyle/>
+          <a:p>
+            <a:r>
+              <a:rPr lang="en-US" dirty="0" smtClean="0"/>
+              <a:t>What’s more dangerous at the Beach?</a:t>
+            </a:r>
+            <a:endParaRPr lang="en-US" dirty="0"/>
+          </a:p>
+        </p:txBody>
+      </p:sp>
+      <p:sp>
+        <p:nvSpPr>
+          <p:cNvPr id="3" name="Content Placeholder 2"/>
+          <p:cNvSpPr>
+            <a:spLocks noGrp="1"/>
+          </p:cNvSpPr>
+          <p:nvPr>
+            <p:ph sz="half" idx="1"/>
+          </p:nvPr>
+        </p:nvSpPr>
+        <p:spPr/>
+        <p:txBody>
           <a:bodyPr/>
           <a:lstStyle/>
           <a:p>
+            <a:pPr>
+              <a:buNone/>
+            </a:pPr>
             <a:r>
               <a:rPr lang="en-US" dirty="0" smtClean="0"/>
-              <a:t>Racial Inequalities and IQ</a:t>
-            </a:r>
-            <a:endParaRPr lang="en-US" dirty="0"/>
+              <a:t>"</a:t>
+            </a:r>
+            <a:r>
+              <a:rPr lang="en-US" dirty="0"/>
+              <a:t>Falling coconuts kill 150 people worldwide each year, 15 times the number of fatalities attributable to sharks."</a:t>
+            </a:r>
           </a:p>
         </p:txBody>
       </p:sp>
       <p:pic>
         <p:nvPicPr>
-          <p:cNvPr id="5" name="Content Placeholder 4" descr="retar0{image0}.gif"/>
+          <p:cNvPr id="7" name="Picture 6"/>
           <p:cNvPicPr>
-            <a:picLocks noGrp="1" noChangeAspect="1"/>
+            <a:picLocks noChangeAspect="1"/>
           </p:cNvPicPr>
-          <p:nvPr>
-            <p:ph sz="half" idx="2"/>
-          </p:nvPr>
+          <p:nvPr/>
         </p:nvPicPr>
         <p:blipFill>
-          <a:blip r:embed="rId2" cstate="print"/>
+          <a:blip r:embed="rId2" cstate="print">
+            <a:extLst>
+              <a:ext uri="{28A0092B-C50C-407E-A947-70E740481C1C}">
+                <a14:useLocalDpi xmlns:a14="http://schemas.microsoft.com/office/drawing/2010/main" val="0"/>
+              </a:ext>
+            </a:extLst>
+          </a:blip>
           <a:stretch>
             <a:fillRect/>
           </a:stretch>
         </p:blipFill>
         <p:spPr>
           <a:xfrm>
-            <a:off x="1676400" y="1371600"/>
-            <a:ext cx="5715000" cy="4861460"/>
+            <a:off x="3962400" y="3810000"/>
+            <a:ext cx="4038600" cy="2903888"/>
           </a:xfrm>
+          <a:prstGeom prst="rect">
+            <a:avLst/>
+          </a:prstGeom>
         </p:spPr>
       </p:pic>
+      <p:pic>
+        <p:nvPicPr>
+          <p:cNvPr id="6" name="Content Placeholder 5"/>
+          <p:cNvPicPr>
+            <a:picLocks noGrp="1" noChangeAspect="1"/>
+          </p:cNvPicPr>
+          <p:nvPr>
+            <p:ph sz="half" idx="2"/>
+          </p:nvPr>
+        </p:nvPicPr>
+        <p:blipFill>
+          <a:blip r:embed="rId3" cstate="print">
+            <a:extLst>
+              <a:ext uri="{28A0092B-C50C-407E-A947-70E740481C1C}">
+                <a14:useLocalDpi xmlns:a14="http://schemas.microsoft.com/office/drawing/2010/main" val="0"/>
+              </a:ext>
+            </a:extLst>
+          </a:blip>
+          <a:stretch>
+            <a:fillRect/>
+          </a:stretch>
+        </p:blipFill>
+        <p:spPr>
+          <a:xfrm>
+            <a:off x="4648200" y="1524000"/>
+            <a:ext cx="4038600" cy="2524125"/>
+          </a:xfrm>
+          <a:prstGeom prst="rect">
+            <a:avLst/>
+          </a:prstGeom>
+          <a:ln w="88900" cap="sq" cmpd="thickThin">
+            <a:solidFill>
+              <a:srgbClr val="000000"/>
+            </a:solidFill>
+            <a:prstDash val="solid"/>
+            <a:miter lim="800000"/>
+          </a:ln>
+          <a:effectLst>
+            <a:innerShdw blurRad="76200">
+              <a:srgbClr val="000000"/>
+            </a:innerShdw>
+          </a:effectLst>
+        </p:spPr>
+      </p:pic>
+      <p:sp>
+        <p:nvSpPr>
+          <p:cNvPr id="8" name="Rectangle 7"/>
+          <p:cNvSpPr/>
+          <p:nvPr/>
+        </p:nvSpPr>
+        <p:spPr>
+          <a:xfrm>
+            <a:off x="595707" y="4419600"/>
+            <a:ext cx="1587999" cy="415498"/>
+          </a:xfrm>
+          <a:prstGeom prst="rect">
+            <a:avLst/>
+          </a:prstGeom>
+        </p:spPr>
+        <p:txBody>
+          <a:bodyPr wrap="square">
+            <a:spAutoFit/>
+          </a:bodyPr>
+          <a:lstStyle/>
+          <a:p>
+            <a:r>
+              <a:rPr lang="en-US" sz="1050" dirty="0" smtClean="0">
+                <a:hlinkClick r:id="rId4"/>
+              </a:rPr>
+              <a:t>http://www.shark.org.au/quotes.html</a:t>
+            </a:r>
+            <a:endParaRPr lang="en-US" sz="1050" dirty="0"/>
+          </a:p>
+        </p:txBody>
+      </p:sp>
+      <p:sp>
+        <p:nvSpPr>
+          <p:cNvPr id="9" name="Rectangle 8"/>
+          <p:cNvSpPr/>
+          <p:nvPr/>
+        </p:nvSpPr>
+        <p:spPr>
+          <a:xfrm>
+            <a:off x="457200" y="5105400"/>
+            <a:ext cx="3200400" cy="430887"/>
+          </a:xfrm>
+          <a:prstGeom prst="rect">
+            <a:avLst/>
+          </a:prstGeom>
+        </p:spPr>
+        <p:txBody>
+          <a:bodyPr wrap="square">
+            <a:spAutoFit/>
+          </a:bodyPr>
+          <a:lstStyle/>
+          <a:p>
+            <a:r>
+              <a:rPr lang="en-US" sz="1050" dirty="0" smtClean="0">
+                <a:hlinkClick r:id="rId5"/>
+              </a:rPr>
+              <a:t>http://www.straightdope.com/columns/read/2405/are-150-people-killed-each-year-by-falling-coconuts</a:t>
+            </a:r>
+            <a:endParaRPr lang="en-US" sz="1050" dirty="0"/>
+          </a:p>
+        </p:txBody>
+      </p:sp>
     </p:spTree>
+    <p:extLst>
+      <p:ext uri="{BB962C8B-B14F-4D97-AF65-F5344CB8AC3E}">
+        <p14:creationId xmlns:p14="http://schemas.microsoft.com/office/powerpoint/2010/main" val="1377885529"/>
+      </p:ext>
+    </p:extLst>
   </p:cSld>
   <p:clrMapOvr>
     <a:masterClrMapping/>
@@ -3293,7 +3444,7 @@
       </p:grpSpPr>
       <p:sp>
         <p:nvSpPr>
-          <p:cNvPr id="6" name="Title 5"/>
+          <p:cNvPr id="2" name="Title 1"/>
           <p:cNvSpPr>
             <a:spLocks noGrp="1"/>
           </p:cNvSpPr>
@@ -3307,52 +3458,37 @@
           <a:lstStyle/>
           <a:p>
             <a:r>
-              <a:rPr lang="en-US" dirty="0" smtClean="0">
-                <a:latin typeface="Georgia" pitchFamily="18" charset="0"/>
-              </a:rPr>
-              <a:t>Good News</a:t>
-            </a:r>
-            <a:endParaRPr lang="en-US" dirty="0">
-              <a:latin typeface="Georgia" pitchFamily="18" charset="0"/>
-            </a:endParaRPr>
+              <a:rPr lang="en-US" dirty="0" smtClean="0"/>
+              <a:t>Racial Inequalities and IQ</a:t>
+            </a:r>
+            <a:endParaRPr lang="en-US" dirty="0"/>
           </a:p>
         </p:txBody>
       </p:sp>
       <p:pic>
         <p:nvPicPr>
-          <p:cNvPr id="5" name="Content Placeholder 4"/>
+          <p:cNvPr id="5" name="Content Placeholder 4" descr="retar0{image0}.gif"/>
           <p:cNvPicPr>
             <a:picLocks noGrp="1" noChangeAspect="1"/>
           </p:cNvPicPr>
           <p:nvPr>
-            <p:ph idx="1"/>
+            <p:ph sz="half" idx="2"/>
           </p:nvPr>
         </p:nvPicPr>
         <p:blipFill>
-          <a:blip r:embed="rId2" cstate="print">
-            <a:extLst>
-              <a:ext uri="{28A0092B-C50C-407E-A947-70E740481C1C}">
-                <a14:useLocalDpi xmlns="" xmlns:a14="http://schemas.microsoft.com/office/drawing/2010/main" val="0"/>
-              </a:ext>
-            </a:extLst>
-          </a:blip>
+          <a:blip r:embed="rId2" cstate="print"/>
           <a:stretch>
             <a:fillRect/>
           </a:stretch>
         </p:blipFill>
         <p:spPr>
           <a:xfrm>
-            <a:off x="1474015" y="1600200"/>
-            <a:ext cx="6195970" cy="4525963"/>
+            <a:off x="1676400" y="1371600"/>
+            <a:ext cx="5715000" cy="4861460"/>
           </a:xfrm>
         </p:spPr>
       </p:pic>
     </p:spTree>
-    <p:extLst>
-      <p:ext uri="{BB962C8B-B14F-4D97-AF65-F5344CB8AC3E}">
-        <p14:creationId xmlns="" xmlns:p14="http://schemas.microsoft.com/office/powerpoint/2010/main" val="4284677353"/>
-      </p:ext>
-    </p:extLst>
   </p:cSld>
   <p:clrMapOvr>
     <a:masterClrMapping/>
@@ -3379,7 +3515,7 @@
       </p:grpSpPr>
       <p:sp>
         <p:nvSpPr>
-          <p:cNvPr id="2" name="Title 1"/>
+          <p:cNvPr id="6" name="Title 5"/>
           <p:cNvSpPr>
             <a:spLocks noGrp="1"/>
           </p:cNvSpPr>
@@ -3396,7 +3532,7 @@
               <a:rPr lang="en-US" dirty="0" smtClean="0">
                 <a:latin typeface="Georgia" pitchFamily="18" charset="0"/>
               </a:rPr>
-              <a:t>WOW!</a:t>
+              <a:t>Good News</a:t>
             </a:r>
             <a:endParaRPr lang="en-US" dirty="0">
               <a:latin typeface="Georgia" pitchFamily="18" charset="0"/>
@@ -3406,7 +3542,7 @@
       </p:sp>
       <p:pic>
         <p:nvPicPr>
-          <p:cNvPr id="4" name="Content Placeholder 3" descr="waterusage1.png"/>
+          <p:cNvPr id="5" name="Content Placeholder 4"/>
           <p:cNvPicPr>
             <a:picLocks noGrp="1" noChangeAspect="1"/>
           </p:cNvPicPr>
@@ -3415,19 +3551,30 @@
           </p:nvPr>
         </p:nvPicPr>
         <p:blipFill>
-          <a:blip r:embed="rId2" cstate="print"/>
+          <a:blip r:embed="rId2" cstate="print">
+            <a:extLst>
+              <a:ext uri="{28A0092B-C50C-407E-A947-70E740481C1C}">
+                <a14:useLocalDpi xmlns:a14="http://schemas.microsoft.com/office/drawing/2010/main" val="0"/>
+              </a:ext>
+            </a:extLst>
+          </a:blip>
           <a:stretch>
             <a:fillRect/>
           </a:stretch>
         </p:blipFill>
         <p:spPr>
           <a:xfrm>
-            <a:off x="1457945" y="1600200"/>
-            <a:ext cx="6228109" cy="4525963"/>
+            <a:off x="1474015" y="1600200"/>
+            <a:ext cx="6195970" cy="4525963"/>
           </a:xfrm>
         </p:spPr>
       </p:pic>
     </p:spTree>
+    <p:extLst>
+      <p:ext uri="{BB962C8B-B14F-4D97-AF65-F5344CB8AC3E}">
+        <p14:creationId xmlns:p14="http://schemas.microsoft.com/office/powerpoint/2010/main" val="4284677353"/>
+      </p:ext>
+    </p:extLst>
   </p:cSld>
   <p:clrMapOvr>
     <a:masterClrMapping/>
@@ -3471,7 +3618,7 @@
               <a:rPr lang="en-US" dirty="0" smtClean="0">
                 <a:latin typeface="Georgia" pitchFamily="18" charset="0"/>
               </a:rPr>
-              <a:t>WOW?</a:t>
+              <a:t>WOW!</a:t>
             </a:r>
             <a:endParaRPr lang="en-US" dirty="0">
               <a:latin typeface="Georgia" pitchFamily="18" charset="0"/>
@@ -3481,7 +3628,7 @@
       </p:sp>
       <p:pic>
         <p:nvPicPr>
-          <p:cNvPr id="4" name="Content Placeholder 3" descr="waterusage2.png"/>
+          <p:cNvPr id="4" name="Content Placeholder 3" descr="waterusage1.png"/>
           <p:cNvPicPr>
             <a:picLocks noGrp="1" noChangeAspect="1"/>
           </p:cNvPicPr>
@@ -3511,6 +3658,81 @@
 </file>
 
 <file path=ppt/slides/slide14.xml><?xml version="1.0" encoding="utf-8"?>
+<p:sld xmlns:a="http://schemas.openxmlformats.org/drawingml/2006/main" xmlns:r="http://schemas.openxmlformats.org/officeDocument/2006/relationships" xmlns:p="http://schemas.openxmlformats.org/presentationml/2006/main">
+  <p:cSld>
+    <p:spTree>
+      <p:nvGrpSpPr>
+        <p:cNvPr id="1" name=""/>
+        <p:cNvGrpSpPr/>
+        <p:nvPr/>
+      </p:nvGrpSpPr>
+      <p:grpSpPr>
+        <a:xfrm>
+          <a:off x="0" y="0"/>
+          <a:ext cx="0" cy="0"/>
+          <a:chOff x="0" y="0"/>
+          <a:chExt cx="0" cy="0"/>
+        </a:xfrm>
+      </p:grpSpPr>
+      <p:sp>
+        <p:nvSpPr>
+          <p:cNvPr id="2" name="Title 1"/>
+          <p:cNvSpPr>
+            <a:spLocks noGrp="1"/>
+          </p:cNvSpPr>
+          <p:nvPr>
+            <p:ph type="title"/>
+          </p:nvPr>
+        </p:nvSpPr>
+        <p:spPr/>
+        <p:txBody>
+          <a:bodyPr/>
+          <a:lstStyle/>
+          <a:p>
+            <a:r>
+              <a:rPr lang="en-US" dirty="0" smtClean="0">
+                <a:latin typeface="Georgia" pitchFamily="18" charset="0"/>
+              </a:rPr>
+              <a:t>WOW?</a:t>
+            </a:r>
+            <a:endParaRPr lang="en-US" dirty="0">
+              <a:latin typeface="Georgia" pitchFamily="18" charset="0"/>
+            </a:endParaRPr>
+          </a:p>
+        </p:txBody>
+      </p:sp>
+      <p:pic>
+        <p:nvPicPr>
+          <p:cNvPr id="4" name="Content Placeholder 3" descr="waterusage2.png"/>
+          <p:cNvPicPr>
+            <a:picLocks noGrp="1" noChangeAspect="1"/>
+          </p:cNvPicPr>
+          <p:nvPr>
+            <p:ph idx="1"/>
+          </p:nvPr>
+        </p:nvPicPr>
+        <p:blipFill>
+          <a:blip r:embed="rId2" cstate="print"/>
+          <a:stretch>
+            <a:fillRect/>
+          </a:stretch>
+        </p:blipFill>
+        <p:spPr>
+          <a:xfrm>
+            <a:off x="1457945" y="1600200"/>
+            <a:ext cx="6228109" cy="4525963"/>
+          </a:xfrm>
+        </p:spPr>
+      </p:pic>
+    </p:spTree>
+  </p:cSld>
+  <p:clrMapOvr>
+    <a:masterClrMapping/>
+  </p:clrMapOvr>
+</p:sld>
+</file>
+
+<file path=ppt/slides/slide15.xml><?xml version="1.0" encoding="utf-8"?>
 <p:sld xmlns:a="http://schemas.openxmlformats.org/drawingml/2006/main" xmlns:r="http://schemas.openxmlformats.org/officeDocument/2006/relationships" xmlns:p="http://schemas.openxmlformats.org/presentationml/2006/main">
   <p:cSld>
     <p:spTree>
@@ -3697,106 +3919,145 @@
           </p:style>
         </p:cxnSp>
       </p:grpSp>
-    </p:spTree>
-  </p:cSld>
-  <p:clrMapOvr>
-    <a:masterClrMapping/>
-  </p:clrMapOvr>
-</p:sld>
-</file>
-
-<file path=ppt/slides/slide15.xml><?xml version="1.0" encoding="utf-8"?>
-<p:sld xmlns:a="http://schemas.openxmlformats.org/drawingml/2006/main" xmlns:r="http://schemas.openxmlformats.org/officeDocument/2006/relationships" xmlns:p="http://schemas.openxmlformats.org/presentationml/2006/main">
-  <p:cSld>
-    <p:spTree>
-      <p:nvGrpSpPr>
-        <p:cNvPr id="1" name=""/>
-        <p:cNvGrpSpPr/>
-        <p:nvPr/>
-      </p:nvGrpSpPr>
-      <p:grpSpPr>
-        <a:xfrm>
-          <a:off x="0" y="0"/>
-          <a:ext cx="0" cy="0"/>
-          <a:chOff x="0" y="0"/>
-          <a:chExt cx="0" cy="0"/>
-        </a:xfrm>
-      </p:grpSpPr>
-      <p:sp>
-        <p:nvSpPr>
-          <p:cNvPr id="5" name="Title 4"/>
-          <p:cNvSpPr>
-            <a:spLocks noGrp="1"/>
-          </p:cNvSpPr>
-          <p:nvPr>
-            <p:ph type="title"/>
-          </p:nvPr>
-        </p:nvSpPr>
-        <p:spPr/>
-        <p:txBody>
-          <a:bodyPr>
-            <a:normAutofit fontScale="90000"/>
-          </a:bodyPr>
-          <a:lstStyle/>
-          <a:p>
-            <a:r>
-              <a:rPr lang="en-US" dirty="0" smtClean="0">
-                <a:latin typeface="Georgia" pitchFamily="18" charset="0"/>
-              </a:rPr>
-              <a:t>Thomas Malthus – Theory of Scarcity</a:t>
-            </a:r>
-            <a:endParaRPr lang="en-US" dirty="0">
-              <a:latin typeface="Georgia" pitchFamily="18" charset="0"/>
-            </a:endParaRPr>
-          </a:p>
-        </p:txBody>
-      </p:sp>
-      <p:pic>
-        <p:nvPicPr>
-          <p:cNvPr id="4" name="Content Placeholder 3" descr="malthusbasictheory.png"/>
-          <p:cNvPicPr>
-            <a:picLocks noGrp="1" noChangeAspect="1"/>
-          </p:cNvPicPr>
-          <p:nvPr>
-            <p:ph sz="half" idx="1"/>
-          </p:nvPr>
-        </p:nvPicPr>
-        <p:blipFill>
-          <a:blip r:embed="rId2" cstate="print"/>
-          <a:stretch>
-            <a:fillRect/>
-          </a:stretch>
-        </p:blipFill>
+      <p:cxnSp>
+        <p:nvCxnSpPr>
+          <p:cNvPr id="10" name="Straight Arrow Connector 9"/>
+          <p:cNvCxnSpPr/>
+          <p:nvPr/>
+        </p:nvCxnSpPr>
+        <p:spPr>
+          <a:xfrm flipH="1">
+            <a:off x="7010400" y="2209800"/>
+            <a:ext cx="838200" cy="609600"/>
+          </a:xfrm>
+          <a:prstGeom prst="straightConnector1">
+            <a:avLst/>
+          </a:prstGeom>
+          <a:ln>
+            <a:tailEnd type="arrow"/>
+          </a:ln>
+        </p:spPr>
+        <p:style>
+          <a:lnRef idx="1">
+            <a:schemeClr val="accent1"/>
+          </a:lnRef>
+          <a:fillRef idx="0">
+            <a:schemeClr val="accent1"/>
+          </a:fillRef>
+          <a:effectRef idx="0">
+            <a:schemeClr val="accent1"/>
+          </a:effectRef>
+          <a:fontRef idx="minor">
+            <a:schemeClr val="tx1"/>
+          </a:fontRef>
+        </p:style>
+      </p:cxnSp>
+      <p:cxnSp>
+        <p:nvCxnSpPr>
+          <p:cNvPr id="12" name="Straight Arrow Connector 11"/>
+          <p:cNvCxnSpPr/>
+          <p:nvPr/>
+        </p:nvCxnSpPr>
+        <p:spPr>
+          <a:xfrm flipH="1">
+            <a:off x="7010400" y="2209800"/>
+            <a:ext cx="838200" cy="838200"/>
+          </a:xfrm>
+          <a:prstGeom prst="straightConnector1">
+            <a:avLst/>
+          </a:prstGeom>
+          <a:ln>
+            <a:tailEnd type="arrow"/>
+          </a:ln>
+        </p:spPr>
+        <p:style>
+          <a:lnRef idx="1">
+            <a:schemeClr val="accent1"/>
+          </a:lnRef>
+          <a:fillRef idx="0">
+            <a:schemeClr val="accent1"/>
+          </a:fillRef>
+          <a:effectRef idx="0">
+            <a:schemeClr val="accent1"/>
+          </a:effectRef>
+          <a:fontRef idx="minor">
+            <a:schemeClr val="tx1"/>
+          </a:fontRef>
+        </p:style>
+      </p:cxnSp>
+      <p:cxnSp>
+        <p:nvCxnSpPr>
+          <p:cNvPr id="15" name="Straight Arrow Connector 14"/>
+          <p:cNvCxnSpPr/>
+          <p:nvPr/>
+        </p:nvCxnSpPr>
+        <p:spPr>
+          <a:xfrm flipH="1">
+            <a:off x="7010400" y="2209800"/>
+            <a:ext cx="838200" cy="1219200"/>
+          </a:xfrm>
+          <a:prstGeom prst="straightConnector1">
+            <a:avLst/>
+          </a:prstGeom>
+          <a:ln>
+            <a:tailEnd type="arrow"/>
+          </a:ln>
+        </p:spPr>
+        <p:style>
+          <a:lnRef idx="1">
+            <a:schemeClr val="accent1"/>
+          </a:lnRef>
+          <a:fillRef idx="0">
+            <a:schemeClr val="accent1"/>
+          </a:fillRef>
+          <a:effectRef idx="0">
+            <a:schemeClr val="accent1"/>
+          </a:effectRef>
+          <a:fontRef idx="minor">
+            <a:schemeClr val="tx1"/>
+          </a:fontRef>
+        </p:style>
+      </p:cxnSp>
+      <p:sp>
+        <p:nvSpPr>
+          <p:cNvPr id="18" name="TextBox 17"/>
+          <p:cNvSpPr txBox="1"/>
+          <p:nvPr/>
+        </p:nvSpPr>
         <p:spPr>
           <a:xfrm>
-            <a:off x="304800" y="2209800"/>
-            <a:ext cx="4400384" cy="3055547"/>
+            <a:off x="7032396" y="1523999"/>
+            <a:ext cx="1981200" cy="646331"/>
           </a:xfrm>
+          <a:prstGeom prst="rect">
+            <a:avLst/>
+          </a:prstGeom>
+          <a:solidFill>
+            <a:schemeClr val="bg1"/>
+          </a:solidFill>
+          <a:ln>
+            <a:solidFill>
+              <a:schemeClr val="tx1">
+                <a:lumMod val="50000"/>
+                <a:lumOff val="50000"/>
+              </a:schemeClr>
+            </a:solidFill>
+          </a:ln>
         </p:spPr>
-      </p:pic>
-      <p:pic>
-        <p:nvPicPr>
-          <p:cNvPr id="7" name="Content Placeholder 6" descr="malthus.png"/>
-          <p:cNvPicPr>
-            <a:picLocks noGrp="1" noChangeAspect="1"/>
-          </p:cNvPicPr>
-          <p:nvPr>
-            <p:ph sz="half" idx="2"/>
-          </p:nvPr>
-        </p:nvPicPr>
-        <p:blipFill>
-          <a:blip r:embed="rId3" cstate="print"/>
-          <a:stretch>
-            <a:fillRect/>
-          </a:stretch>
-        </p:blipFill>
-        <p:spPr>
-          <a:xfrm>
-            <a:off x="5014109" y="1600200"/>
-            <a:ext cx="3306782" cy="4525963"/>
-          </a:xfrm>
-        </p:spPr>
-      </p:pic>
+        <p:txBody>
+          <a:bodyPr wrap="square" rtlCol="0">
+            <a:spAutoFit/>
+          </a:bodyPr>
+          <a:lstStyle/>
+          <a:p>
+            <a:r>
+              <a:rPr lang="en-US" dirty="0" smtClean="0"/>
+              <a:t>Very Hypothetical Sustainable Levels</a:t>
+            </a:r>
+            <a:endParaRPr lang="en-US" dirty="0"/>
+          </a:p>
+        </p:txBody>
+      </p:sp>
     </p:spTree>
   </p:cSld>
   <p:clrMapOvr>
@@ -3824,7 +4085,7 @@
       </p:grpSpPr>
       <p:sp>
         <p:nvSpPr>
-          <p:cNvPr id="2" name="Title 1"/>
+          <p:cNvPr id="5" name="Title 4"/>
           <p:cNvSpPr>
             <a:spLocks noGrp="1"/>
           </p:cNvSpPr>
@@ -3834,14 +4095,16 @@
         </p:nvSpPr>
         <p:spPr/>
         <p:txBody>
-          <a:bodyPr/>
-          <a:lstStyle/>
-          <a:p>
-            <a:r>
-              <a:rPr lang="en-US" dirty="0" smtClean="0">
-                <a:latin typeface="Georgia" pitchFamily="18" charset="0"/>
-              </a:rPr>
-              <a:t>How We Ask Questions</a:t>
+          <a:bodyPr>
+            <a:normAutofit fontScale="90000"/>
+          </a:bodyPr>
+          <a:lstStyle/>
+          <a:p>
+            <a:r>
+              <a:rPr lang="en-US" dirty="0" smtClean="0">
+                <a:latin typeface="Georgia" pitchFamily="18" charset="0"/>
+              </a:rPr>
+              <a:t>Thomas Malthus – Theory of Scarcity</a:t>
             </a:r>
             <a:endParaRPr lang="en-US" dirty="0">
               <a:latin typeface="Georgia" pitchFamily="18" charset="0"/>
@@ -3849,75 +4112,52 @@
           </a:p>
         </p:txBody>
       </p:sp>
-      <p:sp>
-        <p:nvSpPr>
-          <p:cNvPr id="3" name="Content Placeholder 2"/>
-          <p:cNvSpPr>
-            <a:spLocks noGrp="1"/>
-          </p:cNvSpPr>
-          <p:nvPr>
-            <p:ph idx="1"/>
-          </p:nvPr>
-        </p:nvSpPr>
-        <p:spPr/>
-        <p:txBody>
-          <a:bodyPr/>
-          <a:lstStyle/>
-          <a:p>
-            <a:r>
-              <a:rPr lang="en-US" dirty="0" smtClean="0">
-                <a:latin typeface="Georgia" pitchFamily="18" charset="0"/>
-              </a:rPr>
-              <a:t>Women Water and Work</a:t>
-            </a:r>
-          </a:p>
-          <a:p>
-            <a:pPr lvl="1"/>
-            <a:r>
-              <a:rPr lang="en-US" dirty="0" smtClean="0">
-                <a:latin typeface="Georgia" pitchFamily="18" charset="0"/>
-              </a:rPr>
-              <a:t>Water is scarce.</a:t>
-            </a:r>
-          </a:p>
-          <a:p>
-            <a:pPr lvl="1"/>
-            <a:r>
-              <a:rPr lang="en-US" dirty="0" smtClean="0">
-                <a:latin typeface="Georgia" pitchFamily="18" charset="0"/>
-              </a:rPr>
-              <a:t>Women often suffer from inequality.</a:t>
-            </a:r>
-          </a:p>
-          <a:p>
-            <a:pPr lvl="1"/>
-            <a:r>
-              <a:rPr lang="en-US" dirty="0" smtClean="0">
-                <a:latin typeface="Georgia" pitchFamily="18" charset="0"/>
-              </a:rPr>
-              <a:t>Water is not evenly or fairly distributed.</a:t>
-            </a:r>
-          </a:p>
-          <a:p>
-            <a:pPr lvl="1"/>
-            <a:r>
-              <a:rPr lang="en-US" dirty="0" smtClean="0">
-                <a:latin typeface="Georgia" pitchFamily="18" charset="0"/>
-              </a:rPr>
-              <a:t>Can we solve the water issue by solving inequality issues?</a:t>
-            </a:r>
-          </a:p>
-          <a:p>
-            <a:pPr lvl="1"/>
-            <a:r>
-              <a:rPr lang="en-US" dirty="0" smtClean="0">
-                <a:latin typeface="Georgia" pitchFamily="18" charset="0"/>
-              </a:rPr>
-              <a:t>Can we solve inequality issues by solving water issues?</a:t>
-            </a:r>
-          </a:p>
-        </p:txBody>
-      </p:sp>
+      <p:pic>
+        <p:nvPicPr>
+          <p:cNvPr id="4" name="Content Placeholder 3" descr="malthusbasictheory.png"/>
+          <p:cNvPicPr>
+            <a:picLocks noGrp="1" noChangeAspect="1"/>
+          </p:cNvPicPr>
+          <p:nvPr>
+            <p:ph sz="half" idx="1"/>
+          </p:nvPr>
+        </p:nvPicPr>
+        <p:blipFill>
+          <a:blip r:embed="rId2" cstate="print"/>
+          <a:stretch>
+            <a:fillRect/>
+          </a:stretch>
+        </p:blipFill>
+        <p:spPr>
+          <a:xfrm>
+            <a:off x="304800" y="2209800"/>
+            <a:ext cx="4400384" cy="3055547"/>
+          </a:xfrm>
+        </p:spPr>
+      </p:pic>
+      <p:pic>
+        <p:nvPicPr>
+          <p:cNvPr id="7" name="Content Placeholder 6" descr="malthus.png"/>
+          <p:cNvPicPr>
+            <a:picLocks noGrp="1" noChangeAspect="1"/>
+          </p:cNvPicPr>
+          <p:nvPr>
+            <p:ph sz="half" idx="2"/>
+          </p:nvPr>
+        </p:nvPicPr>
+        <p:blipFill>
+          <a:blip r:embed="rId3" cstate="print"/>
+          <a:stretch>
+            <a:fillRect/>
+          </a:stretch>
+        </p:blipFill>
+        <p:spPr>
+          <a:xfrm>
+            <a:off x="5014109" y="1600200"/>
+            <a:ext cx="3306782" cy="4525963"/>
+          </a:xfrm>
+        </p:spPr>
+      </p:pic>
     </p:spTree>
   </p:cSld>
   <p:clrMapOvr>
@@ -3962,7 +4202,7 @@
               <a:rPr lang="en-US" dirty="0" smtClean="0">
                 <a:latin typeface="Georgia" pitchFamily="18" charset="0"/>
               </a:rPr>
-              <a:t>Assignment!</a:t>
+              <a:t>How We Ask Questions</a:t>
             </a:r>
             <a:endParaRPr lang="en-US" dirty="0">
               <a:latin typeface="Georgia" pitchFamily="18" charset="0"/>
@@ -3989,6 +4229,141 @@
               <a:rPr lang="en-US" dirty="0" smtClean="0">
                 <a:latin typeface="Georgia" pitchFamily="18" charset="0"/>
               </a:rPr>
+              <a:t>Women Water and Work</a:t>
+            </a:r>
+          </a:p>
+          <a:p>
+            <a:pPr lvl="1"/>
+            <a:r>
+              <a:rPr lang="en-US" dirty="0" smtClean="0">
+                <a:latin typeface="Georgia" pitchFamily="18" charset="0"/>
+              </a:rPr>
+              <a:t>Water is scarce.</a:t>
+            </a:r>
+          </a:p>
+          <a:p>
+            <a:pPr lvl="1"/>
+            <a:r>
+              <a:rPr lang="en-US" dirty="0" smtClean="0">
+                <a:latin typeface="Georgia" pitchFamily="18" charset="0"/>
+              </a:rPr>
+              <a:t>Women often suffer from inequality.</a:t>
+            </a:r>
+          </a:p>
+          <a:p>
+            <a:pPr lvl="1"/>
+            <a:r>
+              <a:rPr lang="en-US" dirty="0" smtClean="0">
+                <a:latin typeface="Georgia" pitchFamily="18" charset="0"/>
+              </a:rPr>
+              <a:t>Water is not evenly or fairly distributed.</a:t>
+            </a:r>
+          </a:p>
+          <a:p>
+            <a:pPr lvl="1"/>
+            <a:r>
+              <a:rPr lang="en-US" dirty="0" smtClean="0">
+                <a:latin typeface="Georgia" pitchFamily="18" charset="0"/>
+              </a:rPr>
+              <a:t>Can we solve the water </a:t>
+            </a:r>
+            <a:r>
+              <a:rPr lang="en-US" dirty="0" smtClean="0">
+                <a:latin typeface="Georgia" pitchFamily="18" charset="0"/>
+              </a:rPr>
+              <a:t>scarcity issue </a:t>
+            </a:r>
+            <a:r>
+              <a:rPr lang="en-US" dirty="0" smtClean="0">
+                <a:latin typeface="Georgia" pitchFamily="18" charset="0"/>
+              </a:rPr>
+              <a:t>by solving inequality issues?</a:t>
+            </a:r>
+          </a:p>
+          <a:p>
+            <a:pPr lvl="1"/>
+            <a:r>
+              <a:rPr lang="en-US" dirty="0" smtClean="0">
+                <a:latin typeface="Georgia" pitchFamily="18" charset="0"/>
+              </a:rPr>
+              <a:t>Can we solve inequality issues by solving water issues?</a:t>
+            </a:r>
+          </a:p>
+        </p:txBody>
+      </p:sp>
+    </p:spTree>
+  </p:cSld>
+  <p:clrMapOvr>
+    <a:masterClrMapping/>
+  </p:clrMapOvr>
+</p:sld>
+</file>
+
+<file path=ppt/slides/slide18.xml><?xml version="1.0" encoding="utf-8"?>
+<p:sld xmlns:a="http://schemas.openxmlformats.org/drawingml/2006/main" xmlns:r="http://schemas.openxmlformats.org/officeDocument/2006/relationships" xmlns:p="http://schemas.openxmlformats.org/presentationml/2006/main">
+  <p:cSld>
+    <p:spTree>
+      <p:nvGrpSpPr>
+        <p:cNvPr id="1" name=""/>
+        <p:cNvGrpSpPr/>
+        <p:nvPr/>
+      </p:nvGrpSpPr>
+      <p:grpSpPr>
+        <a:xfrm>
+          <a:off x="0" y="0"/>
+          <a:ext cx="0" cy="0"/>
+          <a:chOff x="0" y="0"/>
+          <a:chExt cx="0" cy="0"/>
+        </a:xfrm>
+      </p:grpSpPr>
+      <p:sp>
+        <p:nvSpPr>
+          <p:cNvPr id="2" name="Title 1"/>
+          <p:cNvSpPr>
+            <a:spLocks noGrp="1"/>
+          </p:cNvSpPr>
+          <p:nvPr>
+            <p:ph type="title"/>
+          </p:nvPr>
+        </p:nvSpPr>
+        <p:spPr/>
+        <p:txBody>
+          <a:bodyPr/>
+          <a:lstStyle/>
+          <a:p>
+            <a:r>
+              <a:rPr lang="en-US" dirty="0" smtClean="0">
+                <a:latin typeface="Georgia" pitchFamily="18" charset="0"/>
+              </a:rPr>
+              <a:t>Assignment!</a:t>
+            </a:r>
+            <a:endParaRPr lang="en-US" dirty="0">
+              <a:latin typeface="Georgia" pitchFamily="18" charset="0"/>
+            </a:endParaRPr>
+          </a:p>
+        </p:txBody>
+      </p:sp>
+      <p:sp>
+        <p:nvSpPr>
+          <p:cNvPr id="3" name="Content Placeholder 2"/>
+          <p:cNvSpPr>
+            <a:spLocks noGrp="1"/>
+          </p:cNvSpPr>
+          <p:nvPr>
+            <p:ph idx="1"/>
+          </p:nvPr>
+        </p:nvSpPr>
+        <p:spPr/>
+        <p:txBody>
+          <a:bodyPr>
+            <a:normAutofit lnSpcReduction="10000"/>
+          </a:bodyPr>
+          <a:lstStyle/>
+          <a:p>
+            <a:r>
+              <a:rPr lang="en-US" dirty="0" smtClean="0">
+                <a:latin typeface="Georgia" pitchFamily="18" charset="0"/>
+              </a:rPr>
               <a:t>Work through the ADVANCED WATER FOOTPRINT calculator.</a:t>
             </a:r>
           </a:p>
@@ -3997,25 +4372,7 @@
               <a:rPr lang="en-US" dirty="0" smtClean="0">
                 <a:latin typeface="Georgia" pitchFamily="18" charset="0"/>
               </a:rPr>
-              <a:t>Write an essay </a:t>
-            </a:r>
-            <a:r>
-              <a:rPr lang="en-US" dirty="0" smtClean="0">
-                <a:latin typeface="Georgia" pitchFamily="18" charset="0"/>
-              </a:rPr>
-              <a:t>about </a:t>
-            </a:r>
-            <a:r>
-              <a:rPr lang="en-US" dirty="0" smtClean="0">
-                <a:latin typeface="Georgia" pitchFamily="18" charset="0"/>
-              </a:rPr>
-              <a:t>it</a:t>
-            </a:r>
-            <a:r>
-              <a:rPr lang="en-US" dirty="0" smtClean="0">
-                <a:latin typeface="Georgia" pitchFamily="18" charset="0"/>
-              </a:rPr>
-              <a:t>. (1 page) </a:t>
+              <a:t>Write an essay about it. (1 page) </a:t>
             </a:r>
             <a:endParaRPr lang="en-US" dirty="0" smtClean="0">
               <a:latin typeface="Georgia" pitchFamily="18" charset="0"/>
@@ -4027,51 +4384,219 @@
               <a:rPr lang="en-US" dirty="0" smtClean="0">
                 <a:latin typeface="Georgia" pitchFamily="18" charset="0"/>
               </a:rPr>
-              <a:t>Strengths</a:t>
-            </a:r>
-          </a:p>
-          <a:p>
-            <a:pPr lvl="1"/>
-            <a:r>
-              <a:rPr lang="en-US" dirty="0" smtClean="0">
-                <a:latin typeface="Georgia" pitchFamily="18" charset="0"/>
-              </a:rPr>
-              <a:t>Weaknesses</a:t>
-            </a:r>
-          </a:p>
-          <a:p>
-            <a:pPr lvl="1"/>
-            <a:r>
-              <a:rPr lang="en-US" dirty="0" smtClean="0">
-                <a:latin typeface="Georgia" pitchFamily="18" charset="0"/>
-              </a:rPr>
-              <a:t>Assumptions</a:t>
-            </a:r>
-          </a:p>
-          <a:p>
-            <a:pPr lvl="1"/>
-            <a:r>
-              <a:rPr lang="en-US" dirty="0" smtClean="0">
-                <a:latin typeface="Georgia" pitchFamily="18" charset="0"/>
-              </a:rPr>
-              <a:t>Annoying me in an intelligent way is good.</a:t>
-            </a:r>
-          </a:p>
-          <a:p>
-            <a:pPr lvl="1"/>
-            <a:r>
-              <a:rPr lang="en-US" dirty="0" smtClean="0">
-                <a:latin typeface="Georgia" pitchFamily="18" charset="0"/>
-              </a:rPr>
-              <a:t>Post your writing on the blog</a:t>
+              <a:t>Suggested Themes</a:t>
             </a:r>
             <a:endParaRPr lang="en-US" dirty="0" smtClean="0">
               <a:latin typeface="Georgia" pitchFamily="18" charset="0"/>
             </a:endParaRPr>
           </a:p>
+          <a:p>
+            <a:pPr lvl="2"/>
+            <a:r>
+              <a:rPr lang="en-US" dirty="0" smtClean="0">
+                <a:latin typeface="Georgia" pitchFamily="18" charset="0"/>
+              </a:rPr>
+              <a:t>Strengths</a:t>
+            </a:r>
+          </a:p>
+          <a:p>
+            <a:pPr lvl="2"/>
+            <a:r>
+              <a:rPr lang="en-US" dirty="0" smtClean="0">
+                <a:latin typeface="Georgia" pitchFamily="18" charset="0"/>
+              </a:rPr>
+              <a:t>Weaknesses</a:t>
+            </a:r>
+          </a:p>
+          <a:p>
+            <a:pPr lvl="2"/>
+            <a:r>
+              <a:rPr lang="en-US" dirty="0" smtClean="0">
+                <a:latin typeface="Georgia" pitchFamily="18" charset="0"/>
+              </a:rPr>
+              <a:t>Assumptions</a:t>
+            </a:r>
+          </a:p>
+          <a:p>
+            <a:pPr lvl="1"/>
+            <a:r>
+              <a:rPr lang="en-US" dirty="0" smtClean="0">
+                <a:latin typeface="Georgia" pitchFamily="18" charset="0"/>
+              </a:rPr>
+              <a:t>Annoying me in an intelligent way is good.</a:t>
+            </a:r>
+          </a:p>
+          <a:p>
+            <a:pPr lvl="1"/>
+            <a:r>
+              <a:rPr lang="en-US" dirty="0" smtClean="0">
+                <a:latin typeface="Georgia" pitchFamily="18" charset="0"/>
+              </a:rPr>
+              <a:t>Post your writing on the </a:t>
+            </a:r>
+            <a:r>
+              <a:rPr lang="en-US" dirty="0" smtClean="0">
+                <a:latin typeface="Georgia" pitchFamily="18" charset="0"/>
+              </a:rPr>
+              <a:t>blog</a:t>
+            </a:r>
+          </a:p>
+          <a:p>
+            <a:pPr lvl="2"/>
+            <a:r>
+              <a:rPr lang="en-US" dirty="0" smtClean="0">
+                <a:hlinkClick r:id="rId2"/>
+              </a:rPr>
+              <a:t>http</a:t>
+            </a:r>
+            <a:r>
+              <a:rPr lang="en-US" dirty="0">
+                <a:hlinkClick r:id="rId2"/>
+              </a:rPr>
+              <a:t>://womenwaterwork.org/</a:t>
+            </a:r>
+            <a:endParaRPr lang="en-US" dirty="0" smtClean="0">
+              <a:latin typeface="Georgia" pitchFamily="18" charset="0"/>
+            </a:endParaRPr>
+          </a:p>
         </p:txBody>
       </p:sp>
     </p:spTree>
+  </p:cSld>
+  <p:clrMapOvr>
+    <a:masterClrMapping/>
+  </p:clrMapOvr>
+</p:sld>
+</file>
+
+<file path=ppt/slides/slide19.xml><?xml version="1.0" encoding="utf-8"?>
+<p:sld xmlns:a="http://schemas.openxmlformats.org/drawingml/2006/main" xmlns:r="http://schemas.openxmlformats.org/officeDocument/2006/relationships" xmlns:p="http://schemas.openxmlformats.org/presentationml/2006/main">
+  <p:cSld>
+    <p:spTree>
+      <p:nvGrpSpPr>
+        <p:cNvPr id="1" name=""/>
+        <p:cNvGrpSpPr/>
+        <p:nvPr/>
+      </p:nvGrpSpPr>
+      <p:grpSpPr>
+        <a:xfrm>
+          <a:off x="0" y="0"/>
+          <a:ext cx="0" cy="0"/>
+          <a:chOff x="0" y="0"/>
+          <a:chExt cx="0" cy="0"/>
+        </a:xfrm>
+      </p:grpSpPr>
+      <p:sp>
+        <p:nvSpPr>
+          <p:cNvPr id="2" name="Title 1"/>
+          <p:cNvSpPr>
+            <a:spLocks noGrp="1"/>
+          </p:cNvSpPr>
+          <p:nvPr>
+            <p:ph type="title"/>
+          </p:nvPr>
+        </p:nvSpPr>
+        <p:spPr/>
+        <p:txBody>
+          <a:bodyPr/>
+          <a:lstStyle/>
+          <a:p>
+            <a:r>
+              <a:rPr lang="en-US" dirty="0" smtClean="0">
+                <a:latin typeface="Times New Roman" pitchFamily="18" charset="0"/>
+                <a:cs typeface="Times New Roman" pitchFamily="18" charset="0"/>
+              </a:rPr>
+              <a:t>Working Openly</a:t>
+            </a:r>
+            <a:endParaRPr lang="en-US" dirty="0">
+              <a:latin typeface="Times New Roman" pitchFamily="18" charset="0"/>
+              <a:cs typeface="Times New Roman" pitchFamily="18" charset="0"/>
+            </a:endParaRPr>
+          </a:p>
+        </p:txBody>
+      </p:sp>
+      <p:sp>
+        <p:nvSpPr>
+          <p:cNvPr id="3" name="Content Placeholder 2"/>
+          <p:cNvSpPr>
+            <a:spLocks noGrp="1"/>
+          </p:cNvSpPr>
+          <p:nvPr>
+            <p:ph idx="1"/>
+          </p:nvPr>
+        </p:nvSpPr>
+        <p:spPr/>
+        <p:txBody>
+          <a:bodyPr/>
+          <a:lstStyle/>
+          <a:p>
+            <a:r>
+              <a:rPr lang="en-US" dirty="0" smtClean="0">
+                <a:latin typeface="Times New Roman" pitchFamily="18" charset="0"/>
+                <a:cs typeface="Times New Roman" pitchFamily="18" charset="0"/>
+              </a:rPr>
+              <a:t>The idea is to share and collaborate</a:t>
+            </a:r>
+          </a:p>
+          <a:p>
+            <a:r>
+              <a:rPr lang="en-US" dirty="0" smtClean="0">
+                <a:latin typeface="Times New Roman" pitchFamily="18" charset="0"/>
+                <a:cs typeface="Times New Roman" pitchFamily="18" charset="0"/>
+              </a:rPr>
+              <a:t>Your writing is your own</a:t>
+            </a:r>
+          </a:p>
+          <a:p>
+            <a:r>
+              <a:rPr lang="en-US" dirty="0" smtClean="0">
+                <a:latin typeface="Times New Roman" pitchFamily="18" charset="0"/>
+                <a:cs typeface="Times New Roman" pitchFamily="18" charset="0"/>
+              </a:rPr>
+              <a:t>Borrowing with attribution is recommended</a:t>
+            </a:r>
+          </a:p>
+          <a:p>
+            <a:r>
+              <a:rPr lang="en-US" dirty="0" smtClean="0">
+                <a:latin typeface="Times New Roman" pitchFamily="18" charset="0"/>
+                <a:cs typeface="Times New Roman" pitchFamily="18" charset="0"/>
+              </a:rPr>
+              <a:t>Commenting on your classmates work is a nice thing to do</a:t>
+            </a:r>
+          </a:p>
+          <a:p>
+            <a:r>
+              <a:rPr lang="en-US" dirty="0" smtClean="0">
+                <a:latin typeface="Times New Roman" pitchFamily="18" charset="0"/>
+                <a:cs typeface="Times New Roman" pitchFamily="18" charset="0"/>
+              </a:rPr>
+              <a:t>Editing your work in response to others’ writing and comments is good</a:t>
+            </a:r>
+          </a:p>
+          <a:p>
+            <a:r>
+              <a:rPr lang="en-US" dirty="0" smtClean="0">
+                <a:latin typeface="Times New Roman" pitchFamily="18" charset="0"/>
+                <a:cs typeface="Times New Roman" pitchFamily="18" charset="0"/>
+              </a:rPr>
+              <a:t>PLAGARISM IS RIGHT OUT!!</a:t>
+            </a:r>
+          </a:p>
+          <a:p>
+            <a:endParaRPr lang="en-US" dirty="0">
+              <a:latin typeface="Times New Roman" pitchFamily="18" charset="0"/>
+              <a:cs typeface="Times New Roman" pitchFamily="18" charset="0"/>
+            </a:endParaRPr>
+          </a:p>
+        </p:txBody>
+      </p:sp>
+    </p:spTree>
+    <p:extLst>
+      <p:ext uri="{BB962C8B-B14F-4D97-AF65-F5344CB8AC3E}">
+        <p14:creationId xmlns:p14="http://schemas.microsoft.com/office/powerpoint/2010/main" val="1904288501"/>
+      </p:ext>
+    </p:extLst>
   </p:cSld>
   <p:clrMapOvr>
     <a:masterClrMapping/>
@@ -4385,7 +4910,7 @@
     </p:spTree>
     <p:extLst>
       <p:ext uri="{BB962C8B-B14F-4D97-AF65-F5344CB8AC3E}">
-        <p14:creationId xmlns="" xmlns:p14="http://schemas.microsoft.com/office/powerpoint/2010/main" val="3449405361"/>
+        <p14:creationId xmlns:p14="http://schemas.microsoft.com/office/powerpoint/2010/main" val="3449405361"/>
       </p:ext>
     </p:extLst>
   </p:cSld>
@@ -4510,17 +5035,8 @@
               <a:rPr lang="en-US" b="1" dirty="0" smtClean="0">
                 <a:latin typeface="Georgia" pitchFamily="18" charset="0"/>
               </a:rPr>
-              <a:t>Tim </a:t>
-            </a:r>
-            <a:r>
-              <a:rPr lang="en-US" b="1" dirty="0" smtClean="0">
-                <a:latin typeface="Georgia" pitchFamily="18" charset="0"/>
-              </a:rPr>
-              <a:t>Berners-Lee (Computer Scientist, Inventor of the World Wide Web)</a:t>
-            </a:r>
-            <a:endParaRPr lang="en-US" b="1" dirty="0" smtClean="0">
-              <a:latin typeface="Georgia" pitchFamily="18" charset="0"/>
-            </a:endParaRPr>
+              <a:t>Tim Berners-Lee (Computer Scientist, Inventor of the World Wide Web)</a:t>
+            </a:r>
           </a:p>
           <a:p>
             <a:pPr marL="0" indent="0">
@@ -4561,17 +5077,8 @@
               <a:rPr lang="en-US" b="1" dirty="0" smtClean="0">
                 <a:latin typeface="Georgia" pitchFamily="18" charset="0"/>
               </a:rPr>
-              <a:t>Colin </a:t>
-            </a:r>
-            <a:r>
-              <a:rPr lang="en-US" b="1" dirty="0" smtClean="0">
-                <a:latin typeface="Georgia" pitchFamily="18" charset="0"/>
-              </a:rPr>
-              <a:t>Powell (Army General, Secretary of State)</a:t>
-            </a:r>
-            <a:endParaRPr lang="en-US" b="1" dirty="0" smtClean="0">
-              <a:latin typeface="Georgia" pitchFamily="18" charset="0"/>
-            </a:endParaRPr>
+              <a:t>Colin Powell (Army General, Secretary of State)</a:t>
+            </a:r>
           </a:p>
           <a:p>
             <a:pPr marL="0" indent="0">
@@ -4612,17 +5119,8 @@
               <a:rPr lang="en-US" b="1" dirty="0" smtClean="0">
                 <a:latin typeface="Georgia" pitchFamily="18" charset="0"/>
               </a:rPr>
-              <a:t> </a:t>
-            </a:r>
-            <a:r>
-              <a:rPr lang="en-US" b="1" dirty="0" smtClean="0">
-                <a:latin typeface="Georgia" pitchFamily="18" charset="0"/>
-              </a:rPr>
-              <a:t>Calvino (Author)</a:t>
-            </a:r>
-            <a:endParaRPr lang="en-US" b="1" dirty="0" smtClean="0">
-              <a:latin typeface="Georgia" pitchFamily="18" charset="0"/>
-            </a:endParaRPr>
+              <a:t> Calvino (Author)</a:t>
+            </a:r>
           </a:p>
           <a:p>
             <a:pPr marL="0" indent="0">
@@ -4669,80 +5167,71 @@
               <a:rPr lang="en-US" b="1" dirty="0" smtClean="0">
                 <a:latin typeface="Georgia" pitchFamily="18" charset="0"/>
               </a:rPr>
-              <a:t>Clifford </a:t>
+              <a:t>Clifford Stoll (Astronomer, Author)</a:t>
+            </a:r>
+            <a:r>
+              <a:rPr lang="en-US" dirty="0" smtClean="0">
+                <a:latin typeface="Georgia" pitchFamily="18" charset="0"/>
+              </a:rPr>
+              <a:t/>
+            </a:r>
+            <a:br>
+              <a:rPr lang="en-US" dirty="0" smtClean="0">
+                <a:latin typeface="Georgia" pitchFamily="18" charset="0"/>
+              </a:rPr>
+            </a:br>
+            <a:r>
+              <a:rPr lang="en-US" dirty="0" smtClean="0">
+                <a:latin typeface="Georgia" pitchFamily="18" charset="0"/>
+              </a:rPr>
+              <a:t/>
+            </a:r>
+            <a:br>
+              <a:rPr lang="en-US" dirty="0" smtClean="0">
+                <a:latin typeface="Georgia" pitchFamily="18" charset="0"/>
+              </a:rPr>
+            </a:br>
+            <a:r>
+              <a:rPr lang="en-US" dirty="0">
+                <a:latin typeface="Georgia" pitchFamily="18" charset="0"/>
+              </a:rPr>
+              <a:t>Data is what distinguishes the dilettante from the artist.</a:t>
+            </a:r>
+            <a:r>
+              <a:rPr lang="en-US" dirty="0" smtClean="0">
+                <a:latin typeface="Georgia" pitchFamily="18" charset="0"/>
+              </a:rPr>
+              <a:t/>
+            </a:r>
+            <a:br>
+              <a:rPr lang="en-US" dirty="0" smtClean="0">
+                <a:latin typeface="Georgia" pitchFamily="18" charset="0"/>
+              </a:rPr>
+            </a:br>
+            <a:r>
+              <a:rPr lang="en-US" dirty="0" smtClean="0">
+                <a:latin typeface="Georgia" pitchFamily="18" charset="0"/>
+              </a:rPr>
+              <a:t>	</a:t>
             </a:r>
             <a:r>
               <a:rPr lang="en-US" b="1" dirty="0" smtClean="0">
                 <a:latin typeface="Georgia" pitchFamily="18" charset="0"/>
               </a:rPr>
-              <a:t>Stoll (Astronomer, Author)</a:t>
-            </a:r>
-            <a:r>
-              <a:rPr lang="en-US" dirty="0" smtClean="0">
-                <a:latin typeface="Georgia" pitchFamily="18" charset="0"/>
-              </a:rPr>
-              <a:t/>
-            </a:r>
-            <a:br>
-              <a:rPr lang="en-US" dirty="0" smtClean="0">
-                <a:latin typeface="Georgia" pitchFamily="18" charset="0"/>
-              </a:rPr>
-            </a:br>
-            <a:r>
-              <a:rPr lang="en-US" dirty="0" smtClean="0">
-                <a:latin typeface="Georgia" pitchFamily="18" charset="0"/>
-              </a:rPr>
-              <a:t/>
-            </a:r>
-            <a:br>
-              <a:rPr lang="en-US" dirty="0" smtClean="0">
-                <a:latin typeface="Georgia" pitchFamily="18" charset="0"/>
-              </a:rPr>
-            </a:br>
-            <a:r>
-              <a:rPr lang="en-US" dirty="0">
-                <a:latin typeface="Georgia" pitchFamily="18" charset="0"/>
-              </a:rPr>
-              <a:t>Data is what distinguishes the dilettante from the artist.</a:t>
-            </a:r>
-            <a:r>
-              <a:rPr lang="en-US" dirty="0" smtClean="0">
-                <a:latin typeface="Georgia" pitchFamily="18" charset="0"/>
-              </a:rPr>
-              <a:t/>
-            </a:r>
-            <a:br>
-              <a:rPr lang="en-US" dirty="0" smtClean="0">
-                <a:latin typeface="Georgia" pitchFamily="18" charset="0"/>
-              </a:rPr>
-            </a:br>
-            <a:r>
-              <a:rPr lang="en-US" dirty="0" smtClean="0">
-                <a:latin typeface="Georgia" pitchFamily="18" charset="0"/>
-              </a:rPr>
-              <a:t>	</a:t>
+              <a:t>George </a:t>
+            </a:r>
+            <a:r>
+              <a:rPr lang="en-US" b="1" dirty="0">
+                <a:latin typeface="Georgia" pitchFamily="18" charset="0"/>
+              </a:rPr>
+              <a:t>V. </a:t>
             </a:r>
             <a:r>
               <a:rPr lang="en-US" b="1" dirty="0" smtClean="0">
                 <a:latin typeface="Georgia" pitchFamily="18" charset="0"/>
               </a:rPr>
-              <a:t>George </a:t>
-            </a:r>
-            <a:r>
-              <a:rPr lang="en-US" b="1" dirty="0">
-                <a:latin typeface="Georgia" pitchFamily="18" charset="0"/>
-              </a:rPr>
-              <a:t>V. </a:t>
-            </a:r>
-            <a:r>
-              <a:rPr lang="en-US" b="1" dirty="0" smtClean="0">
-                <a:latin typeface="Georgia" pitchFamily="18" charset="0"/>
-              </a:rPr>
               <a:t>Higgins (Lawyer, Professor, Crime Novelist)</a:t>
             </a:r>
-            <a:endParaRPr lang="en-US" b="1" dirty="0" smtClean="0">
-              <a:latin typeface="Georgia" pitchFamily="18" charset="0"/>
-            </a:endParaRPr>
           </a:p>
           <a:p>
             <a:pPr marL="0" indent="0">
@@ -4771,13 +5260,7 @@
               <a:rPr lang="en-US" b="1" dirty="0" smtClean="0">
                 <a:latin typeface="Georgia" pitchFamily="18" charset="0"/>
               </a:rPr>
-              <a:t>	Home </a:t>
-            </a:r>
-            <a:r>
-              <a:rPr lang="en-US" b="1" dirty="0" smtClean="0">
-                <a:latin typeface="Georgia" pitchFamily="18" charset="0"/>
-              </a:rPr>
-              <a:t>Simpson (Nuclear Safety Engineer, Philosopher)</a:t>
+              <a:t>	Home Simpson (Nuclear Safety Engineer, Philosopher)</a:t>
             </a:r>
             <a:endParaRPr lang="en-US" b="1" dirty="0">
               <a:latin typeface="Georgia" pitchFamily="18" charset="0"/>
@@ -4788,7 +5271,7 @@
     </p:spTree>
     <p:extLst>
       <p:ext uri="{BB962C8B-B14F-4D97-AF65-F5344CB8AC3E}">
-        <p14:creationId xmlns="" xmlns:p14="http://schemas.microsoft.com/office/powerpoint/2010/main" val="417287446"/>
+        <p14:creationId xmlns:p14="http://schemas.microsoft.com/office/powerpoint/2010/main" val="417287446"/>
       </p:ext>
     </p:extLst>
   </p:cSld>
@@ -6438,7 +6921,19 @@
               <a:rPr lang="en-US" dirty="0" smtClean="0">
                 <a:latin typeface="Georgia" pitchFamily="18" charset="0"/>
               </a:rPr>
-              <a:t>So What Does This Mean To Us?</a:t>
+              <a:t>So What Does </a:t>
+            </a:r>
+            <a:r>
+              <a:rPr lang="en-US" dirty="0" smtClean="0">
+                <a:latin typeface="Georgia" pitchFamily="18" charset="0"/>
+              </a:rPr>
+              <a:t>The Scientific Method </a:t>
+            </a:r>
+            <a:r>
+              <a:rPr lang="en-US" dirty="0" smtClean="0">
+                <a:latin typeface="Georgia" pitchFamily="18" charset="0"/>
+              </a:rPr>
+              <a:t>Mean To Us?</a:t>
             </a:r>
             <a:endParaRPr lang="en-US" dirty="0">
               <a:latin typeface="Georgia" pitchFamily="18" charset="0"/>
@@ -6461,39 +6956,6 @@
           <a:bodyPr/>
           <a:lstStyle/>
           <a:p>
-            <a:r>
-              <a:rPr lang="en-US" dirty="0" smtClean="0">
-                <a:latin typeface="Georgia" pitchFamily="18" charset="0"/>
-              </a:rPr>
-              <a:t>Is there a “final” correct answer?</a:t>
-            </a:r>
-            <a:endParaRPr lang="en-US" dirty="0" smtClean="0">
-              <a:latin typeface="Georgia" pitchFamily="18" charset="0"/>
-            </a:endParaRPr>
-          </a:p>
-          <a:p>
-            <a:r>
-              <a:rPr lang="en-US" dirty="0" smtClean="0">
-                <a:latin typeface="Georgia" pitchFamily="18" charset="0"/>
-              </a:rPr>
-              <a:t>Is there a end to the scientific method?</a:t>
-            </a:r>
-          </a:p>
-          <a:p>
-            <a:r>
-              <a:rPr lang="en-US" dirty="0" smtClean="0">
-                <a:latin typeface="Georgia" pitchFamily="18" charset="0"/>
-              </a:rPr>
-              <a:t>Why is it useful?</a:t>
-            </a:r>
-          </a:p>
-          <a:p>
-            <a:r>
-              <a:rPr lang="en-US" dirty="0" smtClean="0">
-                <a:latin typeface="Georgia" pitchFamily="18" charset="0"/>
-              </a:rPr>
-              <a:t>Can we set policy?</a:t>
-            </a:r>
             <a:endParaRPr lang="en-US" dirty="0">
               <a:latin typeface="Georgia" pitchFamily="18" charset="0"/>
             </a:endParaRPr>
@@ -6527,7 +6989,7 @@
       </p:grpSpPr>
       <p:sp>
         <p:nvSpPr>
-          <p:cNvPr id="4" name="Title 3"/>
+          <p:cNvPr id="2" name="Title 1"/>
           <p:cNvSpPr>
             <a:spLocks noGrp="1"/>
           </p:cNvSpPr>
@@ -6543,10 +7005,16 @@
           <a:lstStyle/>
           <a:p>
             <a:r>
-              <a:rPr lang="en-US" dirty="0" smtClean="0"/>
-              <a:t>What’s more dangerous at the Beach?</a:t>
-            </a:r>
-            <a:endParaRPr lang="en-US" dirty="0"/>
+              <a:rPr lang="en-US" dirty="0" smtClean="0">
+                <a:latin typeface="Times New Roman" pitchFamily="18" charset="0"/>
+                <a:cs typeface="Times New Roman" pitchFamily="18" charset="0"/>
+              </a:rPr>
+              <a:t>What Characteristics Should We Attach To Data?</a:t>
+            </a:r>
+            <a:endParaRPr lang="en-US" dirty="0">
+              <a:latin typeface="Times New Roman" pitchFamily="18" charset="0"/>
+              <a:cs typeface="Times New Roman" pitchFamily="18" charset="0"/>
+            </a:endParaRPr>
           </a:p>
         </p:txBody>
       </p:sp>
@@ -6557,7 +7025,7 @@
             <a:spLocks noGrp="1"/>
           </p:cNvSpPr>
           <p:nvPr>
-            <p:ph sz="half" idx="1"/>
+            <p:ph idx="1"/>
           </p:nvPr>
         </p:nvSpPr>
         <p:spPr/>
@@ -6565,160 +7033,17 @@
           <a:bodyPr/>
           <a:lstStyle/>
           <a:p>
-            <a:pPr>
-              <a:buNone/>
-            </a:pPr>
-            <a:r>
-              <a:rPr lang="en-US" dirty="0" smtClean="0"/>
-              <a:t>"</a:t>
-            </a:r>
-            <a:r>
-              <a:rPr lang="en-US" dirty="0"/>
-              <a:t>Falling coconuts kill 150 people worldwide each year, 15 times the number of fatalities attributable to sharks."</a:t>
-            </a:r>
-          </a:p>
-        </p:txBody>
-      </p:sp>
-      <p:pic>
-        <p:nvPicPr>
-          <p:cNvPr id="7" name="Picture 6"/>
-          <p:cNvPicPr>
-            <a:picLocks noChangeAspect="1"/>
-          </p:cNvPicPr>
-          <p:nvPr/>
-        </p:nvPicPr>
-        <p:blipFill>
-          <a:blip r:embed="rId2" cstate="print">
-            <a:extLst>
-              <a:ext uri="{28A0092B-C50C-407E-A947-70E740481C1C}">
-                <a14:useLocalDpi xmlns="" xmlns:a14="http://schemas.microsoft.com/office/drawing/2010/main" val="0"/>
-              </a:ext>
-            </a:extLst>
-          </a:blip>
-          <a:stretch>
-            <a:fillRect/>
-          </a:stretch>
-        </p:blipFill>
-        <p:spPr>
-          <a:xfrm>
-            <a:off x="3962400" y="3810000"/>
-            <a:ext cx="4038600" cy="2903888"/>
-          </a:xfrm>
-          <a:prstGeom prst="rect">
-            <a:avLst/>
-          </a:prstGeom>
-        </p:spPr>
-      </p:pic>
-      <p:pic>
-        <p:nvPicPr>
-          <p:cNvPr id="6" name="Content Placeholder 5"/>
-          <p:cNvPicPr>
-            <a:picLocks noGrp="1" noChangeAspect="1"/>
-          </p:cNvPicPr>
-          <p:nvPr>
-            <p:ph sz="half" idx="2"/>
-          </p:nvPr>
-        </p:nvPicPr>
-        <p:blipFill>
-          <a:blip r:embed="rId3" cstate="print">
-            <a:extLst>
-              <a:ext uri="{28A0092B-C50C-407E-A947-70E740481C1C}">
-                <a14:useLocalDpi xmlns="" xmlns:a14="http://schemas.microsoft.com/office/drawing/2010/main" val="0"/>
-              </a:ext>
-            </a:extLst>
-          </a:blip>
-          <a:stretch>
-            <a:fillRect/>
-          </a:stretch>
-        </p:blipFill>
-        <p:spPr>
-          <a:xfrm>
-            <a:off x="4648200" y="1524000"/>
-            <a:ext cx="4038600" cy="2524125"/>
-          </a:xfrm>
-          <a:prstGeom prst="rect">
-            <a:avLst/>
-          </a:prstGeom>
-          <a:ln w="88900" cap="sq" cmpd="thickThin">
-            <a:solidFill>
-              <a:srgbClr val="000000"/>
-            </a:solidFill>
-            <a:prstDash val="solid"/>
-            <a:miter lim="800000"/>
-          </a:ln>
-          <a:effectLst>
-            <a:innerShdw blurRad="76200">
-              <a:srgbClr val="000000"/>
-            </a:innerShdw>
-          </a:effectLst>
-        </p:spPr>
-      </p:pic>
-      <p:sp>
-        <p:nvSpPr>
-          <p:cNvPr id="8" name="Rectangle 7"/>
-          <p:cNvSpPr/>
-          <p:nvPr/>
-        </p:nvSpPr>
-        <p:spPr>
-          <a:xfrm>
-            <a:off x="595707" y="4419600"/>
-            <a:ext cx="1587999" cy="415498"/>
-          </a:xfrm>
-          <a:prstGeom prst="rect">
-            <a:avLst/>
-          </a:prstGeom>
-        </p:spPr>
-        <p:txBody>
-          <a:bodyPr wrap="square">
-            <a:spAutoFit/>
-          </a:bodyPr>
-          <a:lstStyle/>
-          <a:p>
-            <a:r>
-              <a:rPr lang="en-US" sz="1050" dirty="0" smtClean="0">
-                <a:hlinkClick r:id="rId4"/>
-              </a:rPr>
-              <a:t>http://www.shark.org.au/quotes.html</a:t>
-            </a:r>
-            <a:endParaRPr lang="en-US" sz="1050" dirty="0"/>
-          </a:p>
-        </p:txBody>
-      </p:sp>
-      <p:sp>
-        <p:nvSpPr>
-          <p:cNvPr id="9" name="Rectangle 8"/>
-          <p:cNvSpPr/>
-          <p:nvPr/>
-        </p:nvSpPr>
-        <p:spPr>
-          <a:xfrm>
-            <a:off x="457200" y="5105400"/>
-            <a:ext cx="3200400" cy="430887"/>
-          </a:xfrm>
-          <a:prstGeom prst="rect">
-            <a:avLst/>
-          </a:prstGeom>
-        </p:spPr>
-        <p:txBody>
-          <a:bodyPr wrap="square">
-            <a:spAutoFit/>
-          </a:bodyPr>
-          <a:lstStyle/>
-          <a:p>
-            <a:r>
-              <a:rPr lang="en-US" sz="1050" dirty="0" smtClean="0">
-                <a:hlinkClick r:id="rId5"/>
-              </a:rPr>
-              <a:t>http://www.straightdope.com/columns/read/2405/are-150-people-killed-each-year-by-falling-coconuts</a:t>
-            </a:r>
-            <a:endParaRPr lang="en-US" sz="1050" dirty="0"/>
+            <a:endParaRPr lang="en-US" dirty="0">
+              <a:latin typeface="Times New Roman" pitchFamily="18" charset="0"/>
+              <a:cs typeface="Times New Roman" pitchFamily="18" charset="0"/>
+            </a:endParaRPr>
           </a:p>
         </p:txBody>
       </p:sp>
     </p:spTree>
     <p:extLst>
       <p:ext uri="{BB962C8B-B14F-4D97-AF65-F5344CB8AC3E}">
-        <p14:creationId xmlns="" xmlns:p14="http://schemas.microsoft.com/office/powerpoint/2010/main" val="1377885529"/>
+        <p14:creationId xmlns:p14="http://schemas.microsoft.com/office/powerpoint/2010/main" val="3285252593"/>
       </p:ext>
     </p:extLst>
   </p:cSld>

</xml_diff>